<commit_message>
Update storage image to include alias
</commit_message>
<xml_diff>
--- a/docs/diagrams/StorageComponentClassDiagram.pptx
+++ b/docs/diagrams/StorageComponentClassDiagram.pptx
@@ -107,6 +107,22 @@
       </a:defRPr>
     </a:lvl9pPr>
   </p:defaultTextStyle>
+  <p:extLst>
+    <p:ext uri="{EFAFB233-063F-42B5-8137-9DF3F51BA10A}">
+      <p15:sldGuideLst xmlns:p15="http://schemas.microsoft.com/office/powerpoint/2012/main">
+        <p15:guide id="1" orient="horz" pos="1488">
+          <p15:clr>
+            <a:srgbClr val="A4A3A4"/>
+          </p15:clr>
+        </p15:guide>
+        <p15:guide id="2" pos="2880">
+          <p15:clr>
+            <a:srgbClr val="A4A3A4"/>
+          </p15:clr>
+        </p15:guide>
+      </p15:sldGuideLst>
+    </p:ext>
+  </p:extLst>
 </p:presentation>
 </file>
 
@@ -192,7 +208,7 @@
           <a:p>
             <a:fld id="{F5CC4B3F-88C1-4FFA-B1B6-F41C21DC6924}" type="datetimeFigureOut">
               <a:rPr lang="en-US" smtClean="0"/>
-              <a:t>10/16/2016</a:t>
+              <a:t>3/19/18</a:t>
             </a:fld>
             <a:endParaRPr lang="en-US"/>
           </a:p>
@@ -256,38 +272,37 @@
           <a:p>
             <a:pPr lvl="0"/>
             <a:r>
-              <a:rPr lang="en-US" smtClean="0"/>
+              <a:rPr lang="en-US"/>
               <a:t>Click to edit Master text styles</a:t>
             </a:r>
           </a:p>
           <a:p>
             <a:pPr lvl="1"/>
             <a:r>
-              <a:rPr lang="en-US" smtClean="0"/>
+              <a:rPr lang="en-US"/>
               <a:t>Second level</a:t>
             </a:r>
           </a:p>
           <a:p>
             <a:pPr lvl="2"/>
             <a:r>
-              <a:rPr lang="en-US" smtClean="0"/>
+              <a:rPr lang="en-US"/>
               <a:t>Third level</a:t>
             </a:r>
           </a:p>
           <a:p>
             <a:pPr lvl="3"/>
             <a:r>
-              <a:rPr lang="en-US" smtClean="0"/>
+              <a:rPr lang="en-US"/>
               <a:t>Fourth level</a:t>
             </a:r>
           </a:p>
           <a:p>
             <a:pPr lvl="4"/>
             <a:r>
-              <a:rPr lang="en-US" smtClean="0"/>
+              <a:rPr lang="en-US"/>
               <a:t>Fifth level</a:t>
             </a:r>
-            <a:endParaRPr lang="en-US"/>
           </a:p>
         </p:txBody>
       </p:sp>
@@ -498,10 +513,9 @@
           <a:lstStyle/>
           <a:p>
             <a:r>
-              <a:rPr lang="en-US" smtClean="0"/>
+              <a:rPr lang="en-US"/>
               <a:t>Click to edit Master title style</a:t>
             </a:r>
-            <a:endParaRPr lang="en-US"/>
           </a:p>
         </p:txBody>
       </p:sp>
@@ -617,10 +631,9 @@
           </a:lstStyle>
           <a:p>
             <a:r>
-              <a:rPr lang="en-US" smtClean="0"/>
+              <a:rPr lang="en-US"/>
               <a:t>Click to edit Master subtitle style</a:t>
             </a:r>
-            <a:endParaRPr lang="en-US"/>
           </a:p>
         </p:txBody>
       </p:sp>
@@ -641,7 +654,7 @@
           <a:p>
             <a:fld id="{78C97017-6FC3-485B-9764-EAC9E56C1D49}" type="datetimeFigureOut">
               <a:rPr lang="en-US" smtClean="0"/>
-              <a:t>10/16/2016</a:t>
+              <a:t>3/19/18</a:t>
             </a:fld>
             <a:endParaRPr lang="en-US"/>
           </a:p>
@@ -735,10 +748,9 @@
           <a:lstStyle/>
           <a:p>
             <a:r>
-              <a:rPr lang="en-US" smtClean="0"/>
+              <a:rPr lang="en-US"/>
               <a:t>Click to edit Master title style</a:t>
             </a:r>
-            <a:endParaRPr lang="en-US"/>
           </a:p>
         </p:txBody>
       </p:sp>
@@ -759,38 +771,37 @@
           <a:p>
             <a:pPr lvl="0"/>
             <a:r>
-              <a:rPr lang="en-US" smtClean="0"/>
+              <a:rPr lang="en-US"/>
               <a:t>Click to edit Master text styles</a:t>
             </a:r>
           </a:p>
           <a:p>
             <a:pPr lvl="1"/>
             <a:r>
-              <a:rPr lang="en-US" smtClean="0"/>
+              <a:rPr lang="en-US"/>
               <a:t>Second level</a:t>
             </a:r>
           </a:p>
           <a:p>
             <a:pPr lvl="2"/>
             <a:r>
-              <a:rPr lang="en-US" smtClean="0"/>
+              <a:rPr lang="en-US"/>
               <a:t>Third level</a:t>
             </a:r>
           </a:p>
           <a:p>
             <a:pPr lvl="3"/>
             <a:r>
-              <a:rPr lang="en-US" smtClean="0"/>
+              <a:rPr lang="en-US"/>
               <a:t>Fourth level</a:t>
             </a:r>
           </a:p>
           <a:p>
             <a:pPr lvl="4"/>
             <a:r>
-              <a:rPr lang="en-US" smtClean="0"/>
+              <a:rPr lang="en-US"/>
               <a:t>Fifth level</a:t>
             </a:r>
-            <a:endParaRPr lang="en-US"/>
           </a:p>
         </p:txBody>
       </p:sp>
@@ -811,7 +822,7 @@
           <a:p>
             <a:fld id="{78C97017-6FC3-485B-9764-EAC9E56C1D49}" type="datetimeFigureOut">
               <a:rPr lang="en-US" smtClean="0"/>
-              <a:t>10/16/2016</a:t>
+              <a:t>3/19/18</a:t>
             </a:fld>
             <a:endParaRPr lang="en-US"/>
           </a:p>
@@ -910,10 +921,9 @@
           <a:lstStyle/>
           <a:p>
             <a:r>
-              <a:rPr lang="en-US" smtClean="0"/>
+              <a:rPr lang="en-US"/>
               <a:t>Click to edit Master title style</a:t>
             </a:r>
-            <a:endParaRPr lang="en-US"/>
           </a:p>
         </p:txBody>
       </p:sp>
@@ -939,38 +949,37 @@
           <a:p>
             <a:pPr lvl="0"/>
             <a:r>
-              <a:rPr lang="en-US" smtClean="0"/>
+              <a:rPr lang="en-US"/>
               <a:t>Click to edit Master text styles</a:t>
             </a:r>
           </a:p>
           <a:p>
             <a:pPr lvl="1"/>
             <a:r>
-              <a:rPr lang="en-US" smtClean="0"/>
+              <a:rPr lang="en-US"/>
               <a:t>Second level</a:t>
             </a:r>
           </a:p>
           <a:p>
             <a:pPr lvl="2"/>
             <a:r>
-              <a:rPr lang="en-US" smtClean="0"/>
+              <a:rPr lang="en-US"/>
               <a:t>Third level</a:t>
             </a:r>
           </a:p>
           <a:p>
             <a:pPr lvl="3"/>
             <a:r>
-              <a:rPr lang="en-US" smtClean="0"/>
+              <a:rPr lang="en-US"/>
               <a:t>Fourth level</a:t>
             </a:r>
           </a:p>
           <a:p>
             <a:pPr lvl="4"/>
             <a:r>
-              <a:rPr lang="en-US" smtClean="0"/>
+              <a:rPr lang="en-US"/>
               <a:t>Fifth level</a:t>
             </a:r>
-            <a:endParaRPr lang="en-US"/>
           </a:p>
         </p:txBody>
       </p:sp>
@@ -991,7 +1000,7 @@
           <a:p>
             <a:fld id="{78C97017-6FC3-485B-9764-EAC9E56C1D49}" type="datetimeFigureOut">
               <a:rPr lang="en-US" smtClean="0"/>
-              <a:t>10/16/2016</a:t>
+              <a:t>3/19/18</a:t>
             </a:fld>
             <a:endParaRPr lang="en-US"/>
           </a:p>
@@ -1085,10 +1094,9 @@
           <a:lstStyle/>
           <a:p>
             <a:r>
-              <a:rPr lang="en-US" smtClean="0"/>
+              <a:rPr lang="en-US"/>
               <a:t>Click to edit Master title style</a:t>
             </a:r>
-            <a:endParaRPr lang="en-US"/>
           </a:p>
         </p:txBody>
       </p:sp>
@@ -1109,38 +1117,37 @@
           <a:p>
             <a:pPr lvl="0"/>
             <a:r>
-              <a:rPr lang="en-US" smtClean="0"/>
+              <a:rPr lang="en-US"/>
               <a:t>Click to edit Master text styles</a:t>
             </a:r>
           </a:p>
           <a:p>
             <a:pPr lvl="1"/>
             <a:r>
-              <a:rPr lang="en-US" smtClean="0"/>
+              <a:rPr lang="en-US"/>
               <a:t>Second level</a:t>
             </a:r>
           </a:p>
           <a:p>
             <a:pPr lvl="2"/>
             <a:r>
-              <a:rPr lang="en-US" smtClean="0"/>
+              <a:rPr lang="en-US"/>
               <a:t>Third level</a:t>
             </a:r>
           </a:p>
           <a:p>
             <a:pPr lvl="3"/>
             <a:r>
-              <a:rPr lang="en-US" smtClean="0"/>
+              <a:rPr lang="en-US"/>
               <a:t>Fourth level</a:t>
             </a:r>
           </a:p>
           <a:p>
             <a:pPr lvl="4"/>
             <a:r>
-              <a:rPr lang="en-US" smtClean="0"/>
+              <a:rPr lang="en-US"/>
               <a:t>Fifth level</a:t>
             </a:r>
-            <a:endParaRPr lang="en-US"/>
           </a:p>
         </p:txBody>
       </p:sp>
@@ -1161,7 +1168,7 @@
           <a:p>
             <a:fld id="{78C97017-6FC3-485B-9764-EAC9E56C1D49}" type="datetimeFigureOut">
               <a:rPr lang="en-US" smtClean="0"/>
-              <a:t>10/16/2016</a:t>
+              <a:t>3/19/18</a:t>
             </a:fld>
             <a:endParaRPr lang="en-US"/>
           </a:p>
@@ -1264,10 +1271,9 @@
           </a:lstStyle>
           <a:p>
             <a:r>
-              <a:rPr lang="en-US" smtClean="0"/>
+              <a:rPr lang="en-US"/>
               <a:t>Click to edit Master title style</a:t>
             </a:r>
-            <a:endParaRPr lang="en-US"/>
           </a:p>
         </p:txBody>
       </p:sp>
@@ -1384,7 +1390,7 @@
           <a:p>
             <a:pPr lvl="0"/>
             <a:r>
-              <a:rPr lang="en-US" smtClean="0"/>
+              <a:rPr lang="en-US"/>
               <a:t>Click to edit Master text styles</a:t>
             </a:r>
           </a:p>
@@ -1407,7 +1413,7 @@
           <a:p>
             <a:fld id="{78C97017-6FC3-485B-9764-EAC9E56C1D49}" type="datetimeFigureOut">
               <a:rPr lang="en-US" smtClean="0"/>
-              <a:t>10/16/2016</a:t>
+              <a:t>3/19/18</a:t>
             </a:fld>
             <a:endParaRPr lang="en-US"/>
           </a:p>
@@ -1501,10 +1507,9 @@
           <a:lstStyle/>
           <a:p>
             <a:r>
-              <a:rPr lang="en-US" smtClean="0"/>
+              <a:rPr lang="en-US"/>
               <a:t>Click to edit Master title style</a:t>
             </a:r>
-            <a:endParaRPr lang="en-US"/>
           </a:p>
         </p:txBody>
       </p:sp>
@@ -1558,38 +1563,37 @@
           <a:p>
             <a:pPr lvl="0"/>
             <a:r>
-              <a:rPr lang="en-US" smtClean="0"/>
+              <a:rPr lang="en-US"/>
               <a:t>Click to edit Master text styles</a:t>
             </a:r>
           </a:p>
           <a:p>
             <a:pPr lvl="1"/>
             <a:r>
-              <a:rPr lang="en-US" smtClean="0"/>
+              <a:rPr lang="en-US"/>
               <a:t>Second level</a:t>
             </a:r>
           </a:p>
           <a:p>
             <a:pPr lvl="2"/>
             <a:r>
-              <a:rPr lang="en-US" smtClean="0"/>
+              <a:rPr lang="en-US"/>
               <a:t>Third level</a:t>
             </a:r>
           </a:p>
           <a:p>
             <a:pPr lvl="3"/>
             <a:r>
-              <a:rPr lang="en-US" smtClean="0"/>
+              <a:rPr lang="en-US"/>
               <a:t>Fourth level</a:t>
             </a:r>
           </a:p>
           <a:p>
             <a:pPr lvl="4"/>
             <a:r>
-              <a:rPr lang="en-US" smtClean="0"/>
+              <a:rPr lang="en-US"/>
               <a:t>Fifth level</a:t>
             </a:r>
-            <a:endParaRPr lang="en-US"/>
           </a:p>
         </p:txBody>
       </p:sp>
@@ -1643,38 +1647,37 @@
           <a:p>
             <a:pPr lvl="0"/>
             <a:r>
-              <a:rPr lang="en-US" smtClean="0"/>
+              <a:rPr lang="en-US"/>
               <a:t>Click to edit Master text styles</a:t>
             </a:r>
           </a:p>
           <a:p>
             <a:pPr lvl="1"/>
             <a:r>
-              <a:rPr lang="en-US" smtClean="0"/>
+              <a:rPr lang="en-US"/>
               <a:t>Second level</a:t>
             </a:r>
           </a:p>
           <a:p>
             <a:pPr lvl="2"/>
             <a:r>
-              <a:rPr lang="en-US" smtClean="0"/>
+              <a:rPr lang="en-US"/>
               <a:t>Third level</a:t>
             </a:r>
           </a:p>
           <a:p>
             <a:pPr lvl="3"/>
             <a:r>
-              <a:rPr lang="en-US" smtClean="0"/>
+              <a:rPr lang="en-US"/>
               <a:t>Fourth level</a:t>
             </a:r>
           </a:p>
           <a:p>
             <a:pPr lvl="4"/>
             <a:r>
-              <a:rPr lang="en-US" smtClean="0"/>
+              <a:rPr lang="en-US"/>
               <a:t>Fifth level</a:t>
             </a:r>
-            <a:endParaRPr lang="en-US"/>
           </a:p>
         </p:txBody>
       </p:sp>
@@ -1695,7 +1698,7 @@
           <a:p>
             <a:fld id="{78C97017-6FC3-485B-9764-EAC9E56C1D49}" type="datetimeFigureOut">
               <a:rPr lang="en-US" smtClean="0"/>
-              <a:t>10/16/2016</a:t>
+              <a:t>3/19/18</a:t>
             </a:fld>
             <a:endParaRPr lang="en-US"/>
           </a:p>
@@ -1793,10 +1796,9 @@
           </a:lstStyle>
           <a:p>
             <a:r>
-              <a:rPr lang="en-US" smtClean="0"/>
+              <a:rPr lang="en-US"/>
               <a:t>Click to edit Master title style</a:t>
             </a:r>
-            <a:endParaRPr lang="en-US"/>
           </a:p>
         </p:txBody>
       </p:sp>
@@ -1859,7 +1861,7 @@
           <a:p>
             <a:pPr lvl="0"/>
             <a:r>
-              <a:rPr lang="en-US" smtClean="0"/>
+              <a:rPr lang="en-US"/>
               <a:t>Click to edit Master text styles</a:t>
             </a:r>
           </a:p>
@@ -1915,38 +1917,37 @@
           <a:p>
             <a:pPr lvl="0"/>
             <a:r>
-              <a:rPr lang="en-US" smtClean="0"/>
+              <a:rPr lang="en-US"/>
               <a:t>Click to edit Master text styles</a:t>
             </a:r>
           </a:p>
           <a:p>
             <a:pPr lvl="1"/>
             <a:r>
-              <a:rPr lang="en-US" smtClean="0"/>
+              <a:rPr lang="en-US"/>
               <a:t>Second level</a:t>
             </a:r>
           </a:p>
           <a:p>
             <a:pPr lvl="2"/>
             <a:r>
-              <a:rPr lang="en-US" smtClean="0"/>
+              <a:rPr lang="en-US"/>
               <a:t>Third level</a:t>
             </a:r>
           </a:p>
           <a:p>
             <a:pPr lvl="3"/>
             <a:r>
-              <a:rPr lang="en-US" smtClean="0"/>
+              <a:rPr lang="en-US"/>
               <a:t>Fourth level</a:t>
             </a:r>
           </a:p>
           <a:p>
             <a:pPr lvl="4"/>
             <a:r>
-              <a:rPr lang="en-US" smtClean="0"/>
+              <a:rPr lang="en-US"/>
               <a:t>Fifth level</a:t>
             </a:r>
-            <a:endParaRPr lang="en-US"/>
           </a:p>
         </p:txBody>
       </p:sp>
@@ -2009,7 +2010,7 @@
           <a:p>
             <a:pPr lvl="0"/>
             <a:r>
-              <a:rPr lang="en-US" smtClean="0"/>
+              <a:rPr lang="en-US"/>
               <a:t>Click to edit Master text styles</a:t>
             </a:r>
           </a:p>
@@ -2065,38 +2066,37 @@
           <a:p>
             <a:pPr lvl="0"/>
             <a:r>
-              <a:rPr lang="en-US" smtClean="0"/>
+              <a:rPr lang="en-US"/>
               <a:t>Click to edit Master text styles</a:t>
             </a:r>
           </a:p>
           <a:p>
             <a:pPr lvl="1"/>
             <a:r>
-              <a:rPr lang="en-US" smtClean="0"/>
+              <a:rPr lang="en-US"/>
               <a:t>Second level</a:t>
             </a:r>
           </a:p>
           <a:p>
             <a:pPr lvl="2"/>
             <a:r>
-              <a:rPr lang="en-US" smtClean="0"/>
+              <a:rPr lang="en-US"/>
               <a:t>Third level</a:t>
             </a:r>
           </a:p>
           <a:p>
             <a:pPr lvl="3"/>
             <a:r>
-              <a:rPr lang="en-US" smtClean="0"/>
+              <a:rPr lang="en-US"/>
               <a:t>Fourth level</a:t>
             </a:r>
           </a:p>
           <a:p>
             <a:pPr lvl="4"/>
             <a:r>
-              <a:rPr lang="en-US" smtClean="0"/>
+              <a:rPr lang="en-US"/>
               <a:t>Fifth level</a:t>
             </a:r>
-            <a:endParaRPr lang="en-US"/>
           </a:p>
         </p:txBody>
       </p:sp>
@@ -2117,7 +2117,7 @@
           <a:p>
             <a:fld id="{78C97017-6FC3-485B-9764-EAC9E56C1D49}" type="datetimeFigureOut">
               <a:rPr lang="en-US" smtClean="0"/>
-              <a:t>10/16/2016</a:t>
+              <a:t>3/19/18</a:t>
             </a:fld>
             <a:endParaRPr lang="en-US"/>
           </a:p>
@@ -2211,10 +2211,9 @@
           <a:lstStyle/>
           <a:p>
             <a:r>
-              <a:rPr lang="en-US" smtClean="0"/>
+              <a:rPr lang="en-US"/>
               <a:t>Click to edit Master title style</a:t>
             </a:r>
-            <a:endParaRPr lang="en-US"/>
           </a:p>
         </p:txBody>
       </p:sp>
@@ -2235,7 +2234,7 @@
           <a:p>
             <a:fld id="{78C97017-6FC3-485B-9764-EAC9E56C1D49}" type="datetimeFigureOut">
               <a:rPr lang="en-US" smtClean="0"/>
-              <a:t>10/16/2016</a:t>
+              <a:t>3/19/18</a:t>
             </a:fld>
             <a:endParaRPr lang="en-US"/>
           </a:p>
@@ -2330,7 +2329,7 @@
           <a:p>
             <a:fld id="{78C97017-6FC3-485B-9764-EAC9E56C1D49}" type="datetimeFigureOut">
               <a:rPr lang="en-US" smtClean="0"/>
-              <a:t>10/16/2016</a:t>
+              <a:t>3/19/18</a:t>
             </a:fld>
             <a:endParaRPr lang="en-US"/>
           </a:p>
@@ -2433,10 +2432,9 @@
           </a:lstStyle>
           <a:p>
             <a:r>
-              <a:rPr lang="en-US" smtClean="0"/>
+              <a:rPr lang="en-US"/>
               <a:t>Click to edit Master title style</a:t>
             </a:r>
-            <a:endParaRPr lang="en-US"/>
           </a:p>
         </p:txBody>
       </p:sp>
@@ -2490,38 +2488,37 @@
           <a:p>
             <a:pPr lvl="0"/>
             <a:r>
-              <a:rPr lang="en-US" smtClean="0"/>
+              <a:rPr lang="en-US"/>
               <a:t>Click to edit Master text styles</a:t>
             </a:r>
           </a:p>
           <a:p>
             <a:pPr lvl="1"/>
             <a:r>
-              <a:rPr lang="en-US" smtClean="0"/>
+              <a:rPr lang="en-US"/>
               <a:t>Second level</a:t>
             </a:r>
           </a:p>
           <a:p>
             <a:pPr lvl="2"/>
             <a:r>
-              <a:rPr lang="en-US" smtClean="0"/>
+              <a:rPr lang="en-US"/>
               <a:t>Third level</a:t>
             </a:r>
           </a:p>
           <a:p>
             <a:pPr lvl="3"/>
             <a:r>
-              <a:rPr lang="en-US" smtClean="0"/>
+              <a:rPr lang="en-US"/>
               <a:t>Fourth level</a:t>
             </a:r>
           </a:p>
           <a:p>
             <a:pPr lvl="4"/>
             <a:r>
-              <a:rPr lang="en-US" smtClean="0"/>
+              <a:rPr lang="en-US"/>
               <a:t>Fifth level</a:t>
             </a:r>
-            <a:endParaRPr lang="en-US"/>
           </a:p>
         </p:txBody>
       </p:sp>
@@ -2584,7 +2581,7 @@
           <a:p>
             <a:pPr lvl="0"/>
             <a:r>
-              <a:rPr lang="en-US" smtClean="0"/>
+              <a:rPr lang="en-US"/>
               <a:t>Click to edit Master text styles</a:t>
             </a:r>
           </a:p>
@@ -2607,7 +2604,7 @@
           <a:p>
             <a:fld id="{78C97017-6FC3-485B-9764-EAC9E56C1D49}" type="datetimeFigureOut">
               <a:rPr lang="en-US" smtClean="0"/>
-              <a:t>10/16/2016</a:t>
+              <a:t>3/19/18</a:t>
             </a:fld>
             <a:endParaRPr lang="en-US"/>
           </a:p>
@@ -2710,10 +2707,9 @@
           </a:lstStyle>
           <a:p>
             <a:r>
-              <a:rPr lang="en-US" smtClean="0"/>
+              <a:rPr lang="en-US"/>
               <a:t>Click to edit Master title style</a:t>
             </a:r>
-            <a:endParaRPr lang="en-US"/>
           </a:p>
         </p:txBody>
       </p:sp>
@@ -2837,7 +2833,7 @@
           <a:p>
             <a:pPr lvl="0"/>
             <a:r>
-              <a:rPr lang="en-US" smtClean="0"/>
+              <a:rPr lang="en-US"/>
               <a:t>Click to edit Master text styles</a:t>
             </a:r>
           </a:p>
@@ -2860,7 +2856,7 @@
           <a:p>
             <a:fld id="{78C97017-6FC3-485B-9764-EAC9E56C1D49}" type="datetimeFigureOut">
               <a:rPr lang="en-US" smtClean="0"/>
-              <a:t>10/16/2016</a:t>
+              <a:t>3/19/18</a:t>
             </a:fld>
             <a:endParaRPr lang="en-US"/>
           </a:p>
@@ -2969,10 +2965,9 @@
           <a:lstStyle/>
           <a:p>
             <a:r>
-              <a:rPr lang="en-US" smtClean="0"/>
+              <a:rPr lang="en-US"/>
               <a:t>Click to edit Master title style</a:t>
             </a:r>
-            <a:endParaRPr lang="en-US"/>
           </a:p>
         </p:txBody>
       </p:sp>
@@ -3003,38 +2998,37 @@
           <a:p>
             <a:pPr lvl="0"/>
             <a:r>
-              <a:rPr lang="en-US" smtClean="0"/>
+              <a:rPr lang="en-US"/>
               <a:t>Click to edit Master text styles</a:t>
             </a:r>
           </a:p>
           <a:p>
             <a:pPr lvl="1"/>
             <a:r>
-              <a:rPr lang="en-US" smtClean="0"/>
+              <a:rPr lang="en-US"/>
               <a:t>Second level</a:t>
             </a:r>
           </a:p>
           <a:p>
             <a:pPr lvl="2"/>
             <a:r>
-              <a:rPr lang="en-US" smtClean="0"/>
+              <a:rPr lang="en-US"/>
               <a:t>Third level</a:t>
             </a:r>
           </a:p>
           <a:p>
             <a:pPr lvl="3"/>
             <a:r>
-              <a:rPr lang="en-US" smtClean="0"/>
+              <a:rPr lang="en-US"/>
               <a:t>Fourth level</a:t>
             </a:r>
           </a:p>
           <a:p>
             <a:pPr lvl="4"/>
             <a:r>
-              <a:rPr lang="en-US" smtClean="0"/>
+              <a:rPr lang="en-US"/>
               <a:t>Fifth level</a:t>
             </a:r>
-            <a:endParaRPr lang="en-US"/>
           </a:p>
         </p:txBody>
       </p:sp>
@@ -3073,7 +3067,7 @@
           <a:p>
             <a:fld id="{78C97017-6FC3-485B-9764-EAC9E56C1D49}" type="datetimeFigureOut">
               <a:rPr lang="en-US" smtClean="0"/>
-              <a:t>10/16/2016</a:t>
+              <a:t>3/19/18</a:t>
             </a:fld>
             <a:endParaRPr lang="en-US"/>
           </a:p>
@@ -3456,8 +3450,8 @@
         </p:nvSpPr>
         <p:spPr>
           <a:xfrm>
-            <a:off x="1119865" y="2086382"/>
-            <a:ext cx="7871735" cy="1723618"/>
+            <a:off x="685799" y="1981201"/>
+            <a:ext cx="8005309" cy="2133599"/>
           </a:xfrm>
           <a:prstGeom prst="roundRect">
             <a:avLst>
@@ -3494,7 +3488,7 @@
           <a:lstStyle/>
           <a:p>
             <a:r>
-              <a:rPr lang="en-US" sz="1200" b="1" dirty="0" smtClean="0">
+              <a:rPr lang="en-US" sz="1200" b="1" dirty="0">
                 <a:solidFill>
                   <a:schemeClr val="accent6">
                     <a:lumMod val="75000"/>
@@ -3521,7 +3515,7 @@
         </p:nvSpPr>
         <p:spPr>
           <a:xfrm>
-            <a:off x="2877180" y="3158440"/>
+            <a:off x="2424289" y="3158440"/>
             <a:ext cx="1323049" cy="346760"/>
           </a:xfrm>
           <a:prstGeom prst="rect">
@@ -3561,7 +3555,7 @@
           <a:p>
             <a:pPr algn="ctr"/>
             <a:r>
-              <a:rPr lang="en-US" sz="1050" dirty="0" smtClean="0">
+              <a:rPr lang="en-US" sz="1050" dirty="0">
                 <a:solidFill>
                   <a:schemeClr val="bg1"/>
                 </a:solidFill>
@@ -3569,14 +3563,14 @@
               <a:t>&lt;&lt;interface&gt;&gt;</a:t>
             </a:r>
             <a:br>
-              <a:rPr lang="en-US" sz="1050" dirty="0" smtClean="0">
+              <a:rPr lang="en-US" sz="1050" dirty="0">
                 <a:solidFill>
                   <a:schemeClr val="bg1"/>
                 </a:solidFill>
               </a:rPr>
             </a:br>
             <a:r>
-              <a:rPr lang="en-US" sz="1050" dirty="0" err="1" smtClean="0">
+              <a:rPr lang="en-US" sz="1050" dirty="0" err="1">
                 <a:solidFill>
                   <a:schemeClr val="bg1"/>
                 </a:solidFill>
@@ -3599,7 +3593,7 @@
         </p:nvSpPr>
         <p:spPr>
           <a:xfrm rot="16200000">
-            <a:off x="1683963" y="2868687"/>
+            <a:off x="1231072" y="2868687"/>
             <a:ext cx="1093635" cy="346760"/>
           </a:xfrm>
           <a:prstGeom prst="rect">
@@ -3639,7 +3633,7 @@
           <a:p>
             <a:pPr algn="ctr"/>
             <a:r>
-              <a:rPr lang="en-US" sz="1050" dirty="0" err="1" smtClean="0">
+              <a:rPr lang="en-US" sz="1050" dirty="0" err="1">
                 <a:solidFill>
                   <a:schemeClr val="bg1"/>
                 </a:solidFill>
@@ -3662,7 +3656,7 @@
         </p:nvSpPr>
         <p:spPr>
           <a:xfrm rot="16200000">
-            <a:off x="956202" y="2861202"/>
+            <a:off x="503311" y="2861202"/>
             <a:ext cx="1093635" cy="346760"/>
           </a:xfrm>
           <a:prstGeom prst="rect">
@@ -3713,7 +3707,7 @@
           <a:p>
             <a:pPr algn="ctr"/>
             <a:r>
-              <a:rPr lang="en-US" sz="1050" dirty="0" smtClean="0">
+              <a:rPr lang="en-US" sz="1050" dirty="0">
                 <a:solidFill>
                   <a:schemeClr val="bg1"/>
                 </a:solidFill>
@@ -3736,7 +3730,7 @@
         </p:nvSpPr>
         <p:spPr>
           <a:xfrm rot="16200000">
-            <a:off x="1626910" y="2952291"/>
+            <a:off x="1174019" y="2952291"/>
             <a:ext cx="270504" cy="175523"/>
           </a:xfrm>
           <a:prstGeom prst="triangle">
@@ -3794,7 +3788,7 @@
         </p:nvCxnSpPr>
         <p:spPr>
           <a:xfrm>
-            <a:off x="2656370" y="3326536"/>
+            <a:off x="2203479" y="3326536"/>
             <a:ext cx="220810" cy="5284"/>
           </a:xfrm>
           <a:prstGeom prst="straightConnector1">
@@ -3834,7 +3828,7 @@
         </p:nvCxnSpPr>
         <p:spPr>
           <a:xfrm>
-            <a:off x="910091" y="3040053"/>
+            <a:off x="457200" y="3040053"/>
             <a:ext cx="419548" cy="2860"/>
           </a:xfrm>
           <a:prstGeom prst="bentConnector3">
@@ -3879,7 +3873,7 @@
         </p:nvCxnSpPr>
         <p:spPr>
           <a:xfrm flipV="1">
-            <a:off x="1849924" y="3040052"/>
+            <a:off x="1397033" y="3040052"/>
             <a:ext cx="216105" cy="1"/>
           </a:xfrm>
           <a:prstGeom prst="line">
@@ -3920,7 +3914,7 @@
         </p:nvSpPr>
         <p:spPr>
           <a:xfrm>
-            <a:off x="2420322" y="3239846"/>
+            <a:off x="1967431" y="3239846"/>
             <a:ext cx="236048" cy="173380"/>
           </a:xfrm>
           <a:prstGeom prst="flowChartDecision">
@@ -3974,7 +3968,7 @@
         </p:nvCxnSpPr>
         <p:spPr>
           <a:xfrm flipV="1">
-            <a:off x="4398041" y="3331820"/>
+            <a:off x="3945150" y="3331820"/>
             <a:ext cx="223324" cy="1"/>
           </a:xfrm>
           <a:prstGeom prst="bentConnector3">
@@ -4017,7 +4011,7 @@
         </p:nvSpPr>
         <p:spPr>
           <a:xfrm rot="5400000" flipV="1">
-            <a:off x="4175027" y="3244059"/>
+            <a:off x="3722136" y="3244059"/>
             <a:ext cx="270504" cy="175523"/>
           </a:xfrm>
           <a:prstGeom prst="triangle">
@@ -4075,7 +4069,7 @@
         </p:nvCxnSpPr>
         <p:spPr>
           <a:xfrm>
-            <a:off x="5791200" y="3331820"/>
+            <a:off x="5338309" y="3331820"/>
             <a:ext cx="228600" cy="1970"/>
           </a:xfrm>
           <a:prstGeom prst="bentConnector3">
@@ -4118,7 +4112,7 @@
         </p:nvSpPr>
         <p:spPr>
           <a:xfrm>
-            <a:off x="4621365" y="3158440"/>
+            <a:off x="4168474" y="3158440"/>
             <a:ext cx="1169835" cy="346760"/>
           </a:xfrm>
           <a:prstGeom prst="rect">
@@ -4147,7 +4141,7 @@
           <a:p>
             <a:pPr algn="ctr"/>
             <a:r>
-              <a:rPr lang="en-US" sz="1050" b="1" dirty="0" err="1" smtClean="0">
+              <a:rPr lang="en-US" sz="1050" b="1" dirty="0" err="1">
                 <a:solidFill>
                   <a:schemeClr val="accent6">
                     <a:lumMod val="75000"/>
@@ -4156,18 +4150,8 @@
               </a:rPr>
               <a:t>XmlAddressBook</a:t>
             </a:r>
-            <a:r>
-              <a:rPr lang="en-US" sz="1050" b="1" dirty="0" smtClean="0">
-                <a:solidFill>
-                  <a:schemeClr val="accent6">
-                    <a:lumMod val="75000"/>
-                  </a:schemeClr>
-                </a:solidFill>
-              </a:rPr>
-              <a:t/>
-            </a:r>
             <a:br>
-              <a:rPr lang="en-US" sz="1050" b="1" dirty="0" smtClean="0">
+              <a:rPr lang="en-US" sz="1050" b="1" dirty="0">
                 <a:solidFill>
                   <a:schemeClr val="accent6">
                     <a:lumMod val="75000"/>
@@ -4176,7 +4160,7 @@
               </a:rPr>
             </a:br>
             <a:r>
-              <a:rPr lang="en-US" sz="1050" b="1" dirty="0" smtClean="0">
+              <a:rPr lang="en-US" sz="1050" b="1" dirty="0">
                 <a:solidFill>
                   <a:schemeClr val="accent6">
                     <a:lumMod val="75000"/>
@@ -4203,7 +4187,7 @@
         </p:nvSpPr>
         <p:spPr>
           <a:xfrm>
-            <a:off x="2873943" y="2558040"/>
+            <a:off x="2421052" y="2558040"/>
             <a:ext cx="1323049" cy="346760"/>
           </a:xfrm>
           <a:prstGeom prst="rect">
@@ -4243,7 +4227,7 @@
           <a:p>
             <a:pPr algn="ctr"/>
             <a:r>
-              <a:rPr lang="en-US" sz="1050" dirty="0" smtClean="0">
+              <a:rPr lang="en-US" sz="1050" dirty="0">
                 <a:solidFill>
                   <a:schemeClr val="bg1"/>
                 </a:solidFill>
@@ -4251,14 +4235,14 @@
               <a:t>&lt;&lt;interface&gt;&gt;</a:t>
             </a:r>
             <a:br>
-              <a:rPr lang="en-US" sz="1050" dirty="0" smtClean="0">
+              <a:rPr lang="en-US" sz="1050" dirty="0">
                 <a:solidFill>
                   <a:schemeClr val="bg1"/>
                 </a:solidFill>
               </a:rPr>
             </a:br>
             <a:r>
-              <a:rPr lang="en-US" sz="1050" dirty="0" err="1" smtClean="0">
+              <a:rPr lang="en-US" sz="1050" dirty="0" err="1">
                 <a:solidFill>
                   <a:schemeClr val="bg1"/>
                 </a:solidFill>
@@ -4284,7 +4268,7 @@
         </p:nvCxnSpPr>
         <p:spPr>
           <a:xfrm>
-            <a:off x="2653133" y="2726136"/>
+            <a:off x="2200242" y="2726136"/>
             <a:ext cx="220810" cy="5284"/>
           </a:xfrm>
           <a:prstGeom prst="straightConnector1">
@@ -4324,7 +4308,7 @@
         </p:nvSpPr>
         <p:spPr>
           <a:xfrm>
-            <a:off x="2417085" y="2639446"/>
+            <a:off x="1964194" y="2639446"/>
             <a:ext cx="236048" cy="173380"/>
           </a:xfrm>
           <a:prstGeom prst="flowChartDecision">
@@ -4378,7 +4362,7 @@
         </p:nvCxnSpPr>
         <p:spPr>
           <a:xfrm flipV="1">
-            <a:off x="4394804" y="2731420"/>
+            <a:off x="3941913" y="2731420"/>
             <a:ext cx="223324" cy="1"/>
           </a:xfrm>
           <a:prstGeom prst="bentConnector3">
@@ -4421,7 +4405,7 @@
         </p:nvSpPr>
         <p:spPr>
           <a:xfrm rot="5400000" flipV="1">
-            <a:off x="4171790" y="2643659"/>
+            <a:off x="3718899" y="2643659"/>
             <a:ext cx="270504" cy="175523"/>
           </a:xfrm>
           <a:prstGeom prst="triangle">
@@ -4476,7 +4460,7 @@
         </p:nvSpPr>
         <p:spPr>
           <a:xfrm>
-            <a:off x="4618128" y="2558040"/>
+            <a:off x="4165237" y="2558040"/>
             <a:ext cx="1093635" cy="346760"/>
           </a:xfrm>
           <a:prstGeom prst="rect">
@@ -4516,30 +4500,22 @@
           <a:p>
             <a:pPr algn="ctr"/>
             <a:r>
-              <a:rPr lang="en-US" sz="1050" dirty="0" err="1" smtClean="0">
+              <a:rPr lang="en-US" sz="1050" dirty="0" err="1">
                 <a:solidFill>
                   <a:schemeClr val="bg1"/>
                 </a:solidFill>
               </a:rPr>
               <a:t>JsonUserPrefs</a:t>
             </a:r>
-            <a:r>
-              <a:rPr lang="en-US" sz="1050" dirty="0" smtClean="0">
-                <a:solidFill>
-                  <a:schemeClr val="bg1"/>
-                </a:solidFill>
-              </a:rPr>
-              <a:t/>
-            </a:r>
             <a:br>
-              <a:rPr lang="en-US" sz="1050" dirty="0" smtClean="0">
+              <a:rPr lang="en-US" sz="1050" dirty="0">
                 <a:solidFill>
                   <a:schemeClr val="bg1"/>
                 </a:solidFill>
               </a:rPr>
             </a:br>
             <a:r>
-              <a:rPr lang="en-US" sz="1050" dirty="0" smtClean="0">
+              <a:rPr lang="en-US" sz="1050" dirty="0">
                 <a:solidFill>
                   <a:schemeClr val="bg1"/>
                 </a:solidFill>
@@ -4562,7 +4538,7 @@
         </p:nvSpPr>
         <p:spPr>
           <a:xfrm>
-            <a:off x="6019800" y="3160410"/>
+            <a:off x="5566909" y="3160410"/>
             <a:ext cx="1200707" cy="346760"/>
           </a:xfrm>
           <a:prstGeom prst="rect">
@@ -4591,7 +4567,7 @@
           <a:p>
             <a:pPr algn="ctr"/>
             <a:r>
-              <a:rPr lang="en-US" sz="1050" b="1" dirty="0" err="1" smtClean="0">
+              <a:rPr lang="en-US" sz="1050" b="1" dirty="0" err="1">
                 <a:solidFill>
                   <a:schemeClr val="accent6">
                     <a:lumMod val="75000"/>
@@ -4600,18 +4576,8 @@
               </a:rPr>
               <a:t>XmlSerializable</a:t>
             </a:r>
-            <a:r>
-              <a:rPr lang="en-US" sz="1050" b="1" dirty="0" smtClean="0">
-                <a:solidFill>
-                  <a:schemeClr val="accent6">
-                    <a:lumMod val="75000"/>
-                  </a:schemeClr>
-                </a:solidFill>
-              </a:rPr>
-              <a:t/>
-            </a:r>
             <a:br>
-              <a:rPr lang="en-US" sz="1050" b="1" dirty="0" smtClean="0">
+              <a:rPr lang="en-US" sz="1050" b="1" dirty="0">
                 <a:solidFill>
                   <a:schemeClr val="accent6">
                     <a:lumMod val="75000"/>
@@ -4620,7 +4586,7 @@
               </a:rPr>
             </a:br>
             <a:r>
-              <a:rPr lang="en-US" sz="1050" b="1" dirty="0" err="1" smtClean="0">
+              <a:rPr lang="en-US" sz="1050" b="1" dirty="0" err="1">
                 <a:solidFill>
                   <a:schemeClr val="accent6">
                     <a:lumMod val="75000"/>
@@ -4650,8 +4616,8 @@
         </p:nvCxnSpPr>
         <p:spPr>
           <a:xfrm rot="5400000" flipH="1" flipV="1">
-            <a:off x="8077993" y="2992020"/>
-            <a:ext cx="335208" cy="12700"/>
+            <a:off x="7791154" y="2777143"/>
+            <a:ext cx="251809" cy="2357"/>
           </a:xfrm>
           <a:prstGeom prst="bentConnector3">
             <a:avLst>
@@ -4688,7 +4654,7 @@
         </p:nvSpPr>
         <p:spPr>
           <a:xfrm>
-            <a:off x="7615738" y="2477656"/>
+            <a:off x="7288378" y="2305656"/>
             <a:ext cx="1259718" cy="346760"/>
           </a:xfrm>
           <a:prstGeom prst="rect">
@@ -4717,7 +4683,7 @@
           <a:p>
             <a:pPr algn="ctr"/>
             <a:r>
-              <a:rPr lang="en-US" sz="1050" b="1" dirty="0" err="1" smtClean="0">
+              <a:rPr lang="en-US" sz="1050" b="1" dirty="0" err="1">
                 <a:solidFill>
                   <a:schemeClr val="accent6">
                     <a:lumMod val="75000"/>
@@ -4744,7 +4710,7 @@
         </p:nvSpPr>
         <p:spPr>
           <a:xfrm>
-            <a:off x="7615738" y="3159624"/>
+            <a:off x="7286021" y="2904225"/>
             <a:ext cx="1259718" cy="346760"/>
           </a:xfrm>
           <a:prstGeom prst="rect">
@@ -4773,7 +4739,7 @@
           <a:p>
             <a:pPr algn="ctr"/>
             <a:r>
-              <a:rPr lang="en-US" sz="1050" b="1" dirty="0" err="1" smtClean="0">
+              <a:rPr lang="en-US" sz="1050" b="1" dirty="0" err="1">
                 <a:solidFill>
                   <a:schemeClr val="accent6">
                     <a:lumMod val="75000"/>
@@ -4803,8 +4769,117 @@
         </p:nvCxnSpPr>
         <p:spPr>
           <a:xfrm flipV="1">
-            <a:off x="7220507" y="3333004"/>
-            <a:ext cx="395231" cy="786"/>
+            <a:off x="6767616" y="3077605"/>
+            <a:ext cx="518405" cy="256185"/>
+          </a:xfrm>
+          <a:prstGeom prst="bentConnector3">
+            <a:avLst>
+              <a:gd name="adj1" fmla="val 50000"/>
+            </a:avLst>
+          </a:prstGeom>
+          <a:ln w="19050">
+            <a:prstDash val="sysDot"/>
+            <a:headEnd type="none" w="med" len="med"/>
+            <a:tailEnd type="arrow" w="med" len="med"/>
+          </a:ln>
+          <a:effectLst/>
+        </p:spPr>
+        <p:style>
+          <a:lnRef idx="1">
+            <a:schemeClr val="accent6"/>
+          </a:lnRef>
+          <a:fillRef idx="2">
+            <a:schemeClr val="accent6"/>
+          </a:fillRef>
+          <a:effectRef idx="1">
+            <a:schemeClr val="accent6"/>
+          </a:effectRef>
+          <a:fontRef idx="minor">
+            <a:schemeClr val="dk1"/>
+          </a:fontRef>
+        </p:style>
+      </p:cxnSp>
+      <p:sp>
+        <p:nvSpPr>
+          <p:cNvPr id="26" name="Rectangle 8">
+            <a:extLst>
+              <a:ext uri="{FF2B5EF4-FFF2-40B4-BE49-F238E27FC236}">
+                <a16:creationId xmlns:a16="http://schemas.microsoft.com/office/drawing/2014/main" id="{A8C42B29-DDC5-514A-BCF4-7CAA4462AA0D}"/>
+              </a:ext>
+            </a:extLst>
+          </p:cNvPr>
+          <p:cNvSpPr/>
+          <p:nvPr/>
+        </p:nvSpPr>
+        <p:spPr>
+          <a:xfrm>
+            <a:off x="7286021" y="3467073"/>
+            <a:ext cx="1259718" cy="346760"/>
+          </a:xfrm>
+          <a:prstGeom prst="rect">
+            <a:avLst/>
+          </a:prstGeom>
+          <a:ln w="19050"/>
+          <a:effectLst/>
+        </p:spPr>
+        <p:style>
+          <a:lnRef idx="1">
+            <a:schemeClr val="accent6"/>
+          </a:lnRef>
+          <a:fillRef idx="2">
+            <a:schemeClr val="accent6"/>
+          </a:fillRef>
+          <a:effectRef idx="1">
+            <a:schemeClr val="accent6"/>
+          </a:effectRef>
+          <a:fontRef idx="minor">
+            <a:schemeClr val="dk1"/>
+          </a:fontRef>
+        </p:style>
+        <p:txBody>
+          <a:bodyPr rtlCol="0" anchor="ctr"/>
+          <a:lstStyle/>
+          <a:p>
+            <a:pPr algn="ctr"/>
+            <a:r>
+              <a:rPr lang="en-US" sz="1050" b="1" dirty="0" err="1">
+                <a:solidFill>
+                  <a:schemeClr val="accent6">
+                    <a:lumMod val="75000"/>
+                  </a:schemeClr>
+                </a:solidFill>
+              </a:rPr>
+              <a:t>XmlAdaptedAlias</a:t>
+            </a:r>
+            <a:endParaRPr lang="en-SG" sz="1050" b="1" dirty="0">
+              <a:solidFill>
+                <a:schemeClr val="accent6">
+                  <a:lumMod val="75000"/>
+                </a:schemeClr>
+              </a:solidFill>
+            </a:endParaRPr>
+          </a:p>
+        </p:txBody>
+      </p:sp>
+      <p:cxnSp>
+        <p:nvCxnSpPr>
+          <p:cNvPr id="27" name="Elbow Connector 122">
+            <a:extLst>
+              <a:ext uri="{FF2B5EF4-FFF2-40B4-BE49-F238E27FC236}">
+                <a16:creationId xmlns:a16="http://schemas.microsoft.com/office/drawing/2014/main" id="{9C75F75B-DF7B-EC46-A6E0-3B868873FA99}"/>
+              </a:ext>
+            </a:extLst>
+          </p:cNvPr>
+          <p:cNvCxnSpPr>
+            <a:cxnSpLocks/>
+            <a:endCxn id="26" idx="1"/>
+          </p:cNvCxnSpPr>
+          <p:nvPr/>
+        </p:nvCxnSpPr>
+        <p:spPr>
+          <a:xfrm>
+            <a:off x="6767569" y="3398972"/>
+            <a:ext cx="518452" cy="241481"/>
           </a:xfrm>
           <a:prstGeom prst="bentConnector3">
             <a:avLst>
@@ -4843,13 +4918,6 @@
   <p:clrMapOvr>
     <a:masterClrMapping/>
   </p:clrMapOvr>
-  <p:timing>
-    <p:tnLst>
-      <p:par>
-        <p:cTn id="1" dur="indefinite" restart="never" nodeType="tmRoot"/>
-      </p:par>
-    </p:tnLst>
-  </p:timing>
 </p:sld>
 </file>
 

</xml_diff>

<commit_message>
[#248] Edit DG (everything except appendices) (#254)
* Add major/minor feature documentation for everyone

* Userguide typo fixes

* Merge branch 'LoginTestDevelopment' of https://github.com/dominickenn/main

# Conflicts:
#	src/main/java/seedu/organizer/logic/parser/OrganizerParser.java
#	src/test/java/systemtests/AddCommandSystemTest.java
#	src/test/java/systemtests/EditCommandSystemTest.java
#	src/test/java/systemtests/FindNameCommandSystemTest.java

* Revert "Merge branch 'LoginTestDevelopment' of https://github.com/dominickenn/main"

This reverts commit a55ef3e16d15e877b55d8374e5d951c4dff07c01.

* Fix merge conflict

* Edit message

* Typo error fix

* Update TestApp.java

* Update AddCommandParserTest.java

* Section 1 and 2.

* Section 3.1

* Section 3.2

* Section 3.3

* Section 3.4

* Section 3.5

* Section 3.5

* Section 4

* Section 5

* Section 6

* Section 7
</commit_message>
<xml_diff>
--- a/docs/diagrams/StorageComponentClassDiagram.pptx
+++ b/docs/diagrams/StorageComponentClassDiagram.pptx
@@ -192,7 +192,7 @@
           <a:p>
             <a:fld id="{F5CC4B3F-88C1-4FFA-B1B6-F41C21DC6924}" type="datetimeFigureOut">
               <a:rPr lang="en-US" smtClean="0"/>
-              <a:t>3/8/2018</a:t>
+              <a:t>4/9/2018</a:t>
             </a:fld>
             <a:endParaRPr lang="en-US"/>
           </a:p>
@@ -641,7 +641,7 @@
           <a:p>
             <a:fld id="{78C97017-6FC3-485B-9764-EAC9E56C1D49}" type="datetimeFigureOut">
               <a:rPr lang="en-US" smtClean="0"/>
-              <a:t>3/8/2018</a:t>
+              <a:t>4/9/2018</a:t>
             </a:fld>
             <a:endParaRPr lang="en-US"/>
           </a:p>
@@ -811,7 +811,7 @@
           <a:p>
             <a:fld id="{78C97017-6FC3-485B-9764-EAC9E56C1D49}" type="datetimeFigureOut">
               <a:rPr lang="en-US" smtClean="0"/>
-              <a:t>3/8/2018</a:t>
+              <a:t>4/9/2018</a:t>
             </a:fld>
             <a:endParaRPr lang="en-US"/>
           </a:p>
@@ -991,7 +991,7 @@
           <a:p>
             <a:fld id="{78C97017-6FC3-485B-9764-EAC9E56C1D49}" type="datetimeFigureOut">
               <a:rPr lang="en-US" smtClean="0"/>
-              <a:t>3/8/2018</a:t>
+              <a:t>4/9/2018</a:t>
             </a:fld>
             <a:endParaRPr lang="en-US"/>
           </a:p>
@@ -1161,7 +1161,7 @@
           <a:p>
             <a:fld id="{78C97017-6FC3-485B-9764-EAC9E56C1D49}" type="datetimeFigureOut">
               <a:rPr lang="en-US" smtClean="0"/>
-              <a:t>3/8/2018</a:t>
+              <a:t>4/9/2018</a:t>
             </a:fld>
             <a:endParaRPr lang="en-US"/>
           </a:p>
@@ -1407,7 +1407,7 @@
           <a:p>
             <a:fld id="{78C97017-6FC3-485B-9764-EAC9E56C1D49}" type="datetimeFigureOut">
               <a:rPr lang="en-US" smtClean="0"/>
-              <a:t>3/8/2018</a:t>
+              <a:t>4/9/2018</a:t>
             </a:fld>
             <a:endParaRPr lang="en-US"/>
           </a:p>
@@ -1695,7 +1695,7 @@
           <a:p>
             <a:fld id="{78C97017-6FC3-485B-9764-EAC9E56C1D49}" type="datetimeFigureOut">
               <a:rPr lang="en-US" smtClean="0"/>
-              <a:t>3/8/2018</a:t>
+              <a:t>4/9/2018</a:t>
             </a:fld>
             <a:endParaRPr lang="en-US"/>
           </a:p>
@@ -2117,7 +2117,7 @@
           <a:p>
             <a:fld id="{78C97017-6FC3-485B-9764-EAC9E56C1D49}" type="datetimeFigureOut">
               <a:rPr lang="en-US" smtClean="0"/>
-              <a:t>3/8/2018</a:t>
+              <a:t>4/9/2018</a:t>
             </a:fld>
             <a:endParaRPr lang="en-US"/>
           </a:p>
@@ -2235,7 +2235,7 @@
           <a:p>
             <a:fld id="{78C97017-6FC3-485B-9764-EAC9E56C1D49}" type="datetimeFigureOut">
               <a:rPr lang="en-US" smtClean="0"/>
-              <a:t>3/8/2018</a:t>
+              <a:t>4/9/2018</a:t>
             </a:fld>
             <a:endParaRPr lang="en-US"/>
           </a:p>
@@ -2330,7 +2330,7 @@
           <a:p>
             <a:fld id="{78C97017-6FC3-485B-9764-EAC9E56C1D49}" type="datetimeFigureOut">
               <a:rPr lang="en-US" smtClean="0"/>
-              <a:t>3/8/2018</a:t>
+              <a:t>4/9/2018</a:t>
             </a:fld>
             <a:endParaRPr lang="en-US"/>
           </a:p>
@@ -2607,7 +2607,7 @@
           <a:p>
             <a:fld id="{78C97017-6FC3-485B-9764-EAC9E56C1D49}" type="datetimeFigureOut">
               <a:rPr lang="en-US" smtClean="0"/>
-              <a:t>3/8/2018</a:t>
+              <a:t>4/9/2018</a:t>
             </a:fld>
             <a:endParaRPr lang="en-US"/>
           </a:p>
@@ -2860,7 +2860,7 @@
           <a:p>
             <a:fld id="{78C97017-6FC3-485B-9764-EAC9E56C1D49}" type="datetimeFigureOut">
               <a:rPr lang="en-US" smtClean="0"/>
-              <a:t>3/8/2018</a:t>
+              <a:t>4/9/2018</a:t>
             </a:fld>
             <a:endParaRPr lang="en-US"/>
           </a:p>
@@ -3073,7 +3073,7 @@
           <a:p>
             <a:fld id="{78C97017-6FC3-485B-9764-EAC9E56C1D49}" type="datetimeFigureOut">
               <a:rPr lang="en-US" smtClean="0"/>
-              <a:t>3/8/2018</a:t>
+              <a:t>4/9/2018</a:t>
             </a:fld>
             <a:endParaRPr lang="en-US"/>
           </a:p>
@@ -3457,7 +3457,7 @@
         <p:spPr>
           <a:xfrm>
             <a:off x="1119865" y="2086382"/>
-            <a:ext cx="7871735" cy="1723618"/>
+            <a:ext cx="7871735" cy="2180818"/>
           </a:xfrm>
           <a:prstGeom prst="roundRect">
             <a:avLst>
@@ -4805,6 +4805,103 @@
           <a:xfrm flipV="1">
             <a:off x="7220507" y="3333004"/>
             <a:ext cx="395231" cy="786"/>
+          </a:xfrm>
+          <a:prstGeom prst="bentConnector3">
+            <a:avLst>
+              <a:gd name="adj1" fmla="val 50000"/>
+            </a:avLst>
+          </a:prstGeom>
+          <a:ln w="19050">
+            <a:prstDash val="sysDot"/>
+            <a:headEnd type="none" w="med" len="med"/>
+            <a:tailEnd type="arrow" w="med" len="med"/>
+          </a:ln>
+          <a:effectLst/>
+        </p:spPr>
+        <p:style>
+          <a:lnRef idx="1">
+            <a:schemeClr val="accent6"/>
+          </a:lnRef>
+          <a:fillRef idx="2">
+            <a:schemeClr val="accent6"/>
+          </a:fillRef>
+          <a:effectRef idx="1">
+            <a:schemeClr val="accent6"/>
+          </a:effectRef>
+          <a:fontRef idx="minor">
+            <a:schemeClr val="dk1"/>
+          </a:fontRef>
+        </p:style>
+      </p:cxnSp>
+      <p:sp>
+        <p:nvSpPr>
+          <p:cNvPr id="26" name="Rectangle 8"/>
+          <p:cNvSpPr/>
+          <p:nvPr/>
+        </p:nvSpPr>
+        <p:spPr>
+          <a:xfrm>
+            <a:off x="7615738" y="3810000"/>
+            <a:ext cx="1259718" cy="346760"/>
+          </a:xfrm>
+          <a:prstGeom prst="rect">
+            <a:avLst/>
+          </a:prstGeom>
+          <a:ln w="19050"/>
+          <a:effectLst/>
+        </p:spPr>
+        <p:style>
+          <a:lnRef idx="1">
+            <a:schemeClr val="accent6"/>
+          </a:lnRef>
+          <a:fillRef idx="2">
+            <a:schemeClr val="accent6"/>
+          </a:fillRef>
+          <a:effectRef idx="1">
+            <a:schemeClr val="accent6"/>
+          </a:effectRef>
+          <a:fontRef idx="minor">
+            <a:schemeClr val="dk1"/>
+          </a:fontRef>
+        </p:style>
+        <p:txBody>
+          <a:bodyPr rtlCol="0" anchor="ctr"/>
+          <a:lstStyle/>
+          <a:p>
+            <a:pPr algn="ctr"/>
+            <a:r>
+              <a:rPr lang="en-US" sz="1050" b="1" dirty="0" err="1" smtClean="0">
+                <a:solidFill>
+                  <a:schemeClr val="accent6">
+                    <a:lumMod val="75000"/>
+                  </a:schemeClr>
+                </a:solidFill>
+              </a:rPr>
+              <a:t>XmlAdaptedUser</a:t>
+            </a:r>
+            <a:endParaRPr lang="en-SG" sz="1050" b="1" dirty="0">
+              <a:solidFill>
+                <a:schemeClr val="accent6">
+                  <a:lumMod val="75000"/>
+                </a:schemeClr>
+              </a:solidFill>
+            </a:endParaRPr>
+          </a:p>
+        </p:txBody>
+      </p:sp>
+      <p:cxnSp>
+        <p:nvCxnSpPr>
+          <p:cNvPr id="27" name="Elbow Connector 122"/>
+          <p:cNvCxnSpPr>
+            <a:stCxn id="74" idx="2"/>
+            <a:endCxn id="26" idx="0"/>
+          </p:cNvCxnSpPr>
+          <p:nvPr/>
+        </p:nvCxnSpPr>
+        <p:spPr>
+          <a:xfrm rot="5400000">
+            <a:off x="8093789" y="3658192"/>
+            <a:ext cx="303616" cy="12700"/>
           </a:xfrm>
           <a:prstGeom prst="bentConnector3">
             <a:avLst>

</xml_diff>

<commit_message>
Remove duplicated code in XmlRecentBooksStorage, update class diagram (#167)
</commit_message>
<xml_diff>
--- a/docs/diagrams/StorageComponentClassDiagram.pptx
+++ b/docs/diagrams/StorageComponentClassDiagram.pptx
@@ -208,7 +208,7 @@
           <a:p>
             <a:fld id="{F5CC4B3F-88C1-4FFA-B1B6-F41C21DC6924}" type="datetimeFigureOut">
               <a:rPr lang="en-US" smtClean="0"/>
-              <a:t>4/10/2018</a:t>
+              <a:t>4/11/2018</a:t>
             </a:fld>
             <a:endParaRPr lang="en-US"/>
           </a:p>
@@ -654,7 +654,7 @@
           <a:p>
             <a:fld id="{78C97017-6FC3-485B-9764-EAC9E56C1D49}" type="datetimeFigureOut">
               <a:rPr lang="en-US" smtClean="0"/>
-              <a:t>4/10/2018</a:t>
+              <a:t>4/11/2018</a:t>
             </a:fld>
             <a:endParaRPr lang="en-US"/>
           </a:p>
@@ -822,7 +822,7 @@
           <a:p>
             <a:fld id="{78C97017-6FC3-485B-9764-EAC9E56C1D49}" type="datetimeFigureOut">
               <a:rPr lang="en-US" smtClean="0"/>
-              <a:t>4/10/2018</a:t>
+              <a:t>4/11/2018</a:t>
             </a:fld>
             <a:endParaRPr lang="en-US"/>
           </a:p>
@@ -1000,7 +1000,7 @@
           <a:p>
             <a:fld id="{78C97017-6FC3-485B-9764-EAC9E56C1D49}" type="datetimeFigureOut">
               <a:rPr lang="en-US" smtClean="0"/>
-              <a:t>4/10/2018</a:t>
+              <a:t>4/11/2018</a:t>
             </a:fld>
             <a:endParaRPr lang="en-US"/>
           </a:p>
@@ -1168,7 +1168,7 @@
           <a:p>
             <a:fld id="{78C97017-6FC3-485B-9764-EAC9E56C1D49}" type="datetimeFigureOut">
               <a:rPr lang="en-US" smtClean="0"/>
-              <a:t>4/10/2018</a:t>
+              <a:t>4/11/2018</a:t>
             </a:fld>
             <a:endParaRPr lang="en-US"/>
           </a:p>
@@ -1413,7 +1413,7 @@
           <a:p>
             <a:fld id="{78C97017-6FC3-485B-9764-EAC9E56C1D49}" type="datetimeFigureOut">
               <a:rPr lang="en-US" smtClean="0"/>
-              <a:t>4/10/2018</a:t>
+              <a:t>4/11/2018</a:t>
             </a:fld>
             <a:endParaRPr lang="en-US"/>
           </a:p>
@@ -1698,7 +1698,7 @@
           <a:p>
             <a:fld id="{78C97017-6FC3-485B-9764-EAC9E56C1D49}" type="datetimeFigureOut">
               <a:rPr lang="en-US" smtClean="0"/>
-              <a:t>4/10/2018</a:t>
+              <a:t>4/11/2018</a:t>
             </a:fld>
             <a:endParaRPr lang="en-US"/>
           </a:p>
@@ -2117,7 +2117,7 @@
           <a:p>
             <a:fld id="{78C97017-6FC3-485B-9764-EAC9E56C1D49}" type="datetimeFigureOut">
               <a:rPr lang="en-US" smtClean="0"/>
-              <a:t>4/10/2018</a:t>
+              <a:t>4/11/2018</a:t>
             </a:fld>
             <a:endParaRPr lang="en-US"/>
           </a:p>
@@ -2234,7 +2234,7 @@
           <a:p>
             <a:fld id="{78C97017-6FC3-485B-9764-EAC9E56C1D49}" type="datetimeFigureOut">
               <a:rPr lang="en-US" smtClean="0"/>
-              <a:t>4/10/2018</a:t>
+              <a:t>4/11/2018</a:t>
             </a:fld>
             <a:endParaRPr lang="en-US"/>
           </a:p>
@@ -2329,7 +2329,7 @@
           <a:p>
             <a:fld id="{78C97017-6FC3-485B-9764-EAC9E56C1D49}" type="datetimeFigureOut">
               <a:rPr lang="en-US" smtClean="0"/>
-              <a:t>4/10/2018</a:t>
+              <a:t>4/11/2018</a:t>
             </a:fld>
             <a:endParaRPr lang="en-US"/>
           </a:p>
@@ -2604,7 +2604,7 @@
           <a:p>
             <a:fld id="{78C97017-6FC3-485B-9764-EAC9E56C1D49}" type="datetimeFigureOut">
               <a:rPr lang="en-US" smtClean="0"/>
-              <a:t>4/10/2018</a:t>
+              <a:t>4/11/2018</a:t>
             </a:fld>
             <a:endParaRPr lang="en-US"/>
           </a:p>
@@ -2856,7 +2856,7 @@
           <a:p>
             <a:fld id="{78C97017-6FC3-485B-9764-EAC9E56C1D49}" type="datetimeFigureOut">
               <a:rPr lang="en-US" smtClean="0"/>
-              <a:t>4/10/2018</a:t>
+              <a:t>4/11/2018</a:t>
             </a:fld>
             <a:endParaRPr lang="en-US"/>
           </a:p>
@@ -3067,7 +3067,7 @@
           <a:p>
             <a:fld id="{78C97017-6FC3-485B-9764-EAC9E56C1D49}" type="datetimeFigureOut">
               <a:rPr lang="en-US" smtClean="0"/>
-              <a:t>4/10/2018</a:t>
+              <a:t>4/11/2018</a:t>
             </a:fld>
             <a:endParaRPr lang="en-US"/>
           </a:p>
@@ -3451,7 +3451,7 @@
         <p:spPr>
           <a:xfrm>
             <a:off x="1119865" y="2288860"/>
-            <a:ext cx="7871735" cy="2352600"/>
+            <a:ext cx="7871735" cy="2508880"/>
           </a:xfrm>
           <a:prstGeom prst="roundRect">
             <a:avLst>
@@ -3593,8 +3593,8 @@
         </p:nvSpPr>
         <p:spPr>
           <a:xfrm rot="16200000">
-            <a:off x="1336666" y="3391389"/>
-            <a:ext cx="1788230" cy="346760"/>
+            <a:off x="1234454" y="3493601"/>
+            <a:ext cx="1992654" cy="346760"/>
           </a:xfrm>
           <a:prstGeom prst="rect">
             <a:avLst/>
@@ -3656,8 +3656,8 @@
         </p:nvSpPr>
         <p:spPr>
           <a:xfrm rot="16200000">
-            <a:off x="608904" y="3391388"/>
-            <a:ext cx="1788231" cy="346760"/>
+            <a:off x="506692" y="3493600"/>
+            <a:ext cx="1992655" cy="346760"/>
           </a:xfrm>
           <a:prstGeom prst="rect">
             <a:avLst/>
@@ -4906,7 +4906,7 @@
         </p:nvSpPr>
         <p:spPr>
           <a:xfrm>
-            <a:off x="4618128" y="3605576"/>
+            <a:off x="4618128" y="3810000"/>
             <a:ext cx="1169835" cy="346760"/>
           </a:xfrm>
           <a:prstGeom prst="rect">
@@ -4970,7 +4970,7 @@
         </p:nvCxnSpPr>
         <p:spPr>
           <a:xfrm flipV="1">
-            <a:off x="4394804" y="3768554"/>
+            <a:off x="4394804" y="3972978"/>
             <a:ext cx="223324" cy="1"/>
           </a:xfrm>
           <a:prstGeom prst="bentConnector3">
@@ -5019,7 +5019,7 @@
         </p:nvSpPr>
         <p:spPr>
           <a:xfrm rot="5400000" flipV="1">
-            <a:off x="4171790" y="3680793"/>
+            <a:off x="4171790" y="3885217"/>
             <a:ext cx="270504" cy="175523"/>
           </a:xfrm>
           <a:prstGeom prst="triangle">
@@ -5080,7 +5080,7 @@
         </p:nvSpPr>
         <p:spPr>
           <a:xfrm>
-            <a:off x="2873942" y="3647833"/>
+            <a:off x="2873942" y="3852257"/>
             <a:ext cx="1323049" cy="346760"/>
           </a:xfrm>
           <a:prstGeom prst="rect">
@@ -5166,7 +5166,7 @@
         </p:nvCxnSpPr>
         <p:spPr>
           <a:xfrm>
-            <a:off x="2640209" y="3817117"/>
+            <a:off x="2640209" y="4021541"/>
             <a:ext cx="220810" cy="5284"/>
           </a:xfrm>
           <a:prstGeom prst="straightConnector1">
@@ -5212,7 +5212,7 @@
         </p:nvSpPr>
         <p:spPr>
           <a:xfrm>
-            <a:off x="2404161" y="3730427"/>
+            <a:off x="2404161" y="3934851"/>
             <a:ext cx="236048" cy="173380"/>
           </a:xfrm>
           <a:prstGeom prst="flowChartDecision">
@@ -5255,57 +5255,6 @@
           </a:p>
         </p:txBody>
       </p:sp>
-      <p:cxnSp>
-        <p:nvCxnSpPr>
-          <p:cNvPr id="38" name="Elbow Connector 122">
-            <a:extLst>
-              <a:ext uri="{FF2B5EF4-FFF2-40B4-BE49-F238E27FC236}">
-                <a16:creationId xmlns:a16="http://schemas.microsoft.com/office/drawing/2014/main" id="{B81A2D30-EA64-43DD-A9E2-99BD68B4BA5F}"/>
-              </a:ext>
-            </a:extLst>
-          </p:cNvPr>
-          <p:cNvCxnSpPr>
-            <a:cxnSpLocks/>
-            <a:stCxn id="28" idx="3"/>
-            <a:endCxn id="66" idx="2"/>
-          </p:cNvCxnSpPr>
-          <p:nvPr/>
-        </p:nvCxnSpPr>
-        <p:spPr>
-          <a:xfrm flipV="1">
-            <a:off x="5787963" y="3507170"/>
-            <a:ext cx="905088" cy="271786"/>
-          </a:xfrm>
-          <a:prstGeom prst="bentConnector2">
-            <a:avLst/>
-          </a:prstGeom>
-          <a:ln w="19050">
-            <a:solidFill>
-              <a:schemeClr val="accent6">
-                <a:lumMod val="75000"/>
-              </a:schemeClr>
-            </a:solidFill>
-            <a:prstDash val="sysDot"/>
-            <a:headEnd type="none" w="med" len="med"/>
-            <a:tailEnd type="arrow" w="med" len="med"/>
-          </a:ln>
-          <a:effectLst/>
-        </p:spPr>
-        <p:style>
-          <a:lnRef idx="1">
-            <a:schemeClr val="accent2"/>
-          </a:lnRef>
-          <a:fillRef idx="2">
-            <a:schemeClr val="accent2"/>
-          </a:fillRef>
-          <a:effectRef idx="1">
-            <a:schemeClr val="accent2"/>
-          </a:effectRef>
-          <a:fontRef idx="minor">
-            <a:schemeClr val="dk1"/>
-          </a:fontRef>
-        </p:style>
-      </p:cxnSp>
       <p:sp>
         <p:nvSpPr>
           <p:cNvPr id="35" name="Rectangle 8">
@@ -5320,7 +5269,7 @@
         </p:nvSpPr>
         <p:spPr>
           <a:xfrm>
-            <a:off x="2873942" y="4118190"/>
+            <a:off x="2873942" y="4322614"/>
             <a:ext cx="1323049" cy="346760"/>
           </a:xfrm>
           <a:prstGeom prst="rect">
@@ -5406,7 +5355,7 @@
         </p:nvCxnSpPr>
         <p:spPr>
           <a:xfrm>
-            <a:off x="2640209" y="4287474"/>
+            <a:off x="2640209" y="4491898"/>
             <a:ext cx="220810" cy="5284"/>
           </a:xfrm>
           <a:prstGeom prst="straightConnector1">
@@ -5452,7 +5401,7 @@
         </p:nvSpPr>
         <p:spPr>
           <a:xfrm>
-            <a:off x="2404161" y="4200784"/>
+            <a:off x="2404161" y="4405208"/>
             <a:ext cx="236048" cy="173380"/>
           </a:xfrm>
           <a:prstGeom prst="flowChartDecision">
@@ -5512,7 +5461,7 @@
         </p:nvCxnSpPr>
         <p:spPr>
           <a:xfrm flipV="1">
-            <a:off x="4392303" y="4287474"/>
+            <a:off x="4392303" y="4491898"/>
             <a:ext cx="223324" cy="1"/>
           </a:xfrm>
           <a:prstGeom prst="bentConnector3">
@@ -5561,7 +5510,7 @@
         </p:nvSpPr>
         <p:spPr>
           <a:xfrm rot="5400000" flipV="1">
-            <a:off x="4169289" y="4199713"/>
+            <a:off x="4169289" y="4404137"/>
             <a:ext cx="270504" cy="175523"/>
           </a:xfrm>
           <a:prstGeom prst="triangle">
@@ -5622,7 +5571,7 @@
         </p:nvSpPr>
         <p:spPr>
           <a:xfrm>
-            <a:off x="4615627" y="4114094"/>
+            <a:off x="4615627" y="4318518"/>
             <a:ext cx="1169835" cy="346760"/>
           </a:xfrm>
           <a:prstGeom prst="rect">
@@ -5706,7 +5655,7 @@
         </p:nvCxnSpPr>
         <p:spPr>
           <a:xfrm>
-            <a:off x="5791200" y="4285504"/>
+            <a:off x="5791200" y="4489928"/>
             <a:ext cx="381000" cy="1970"/>
           </a:xfrm>
           <a:prstGeom prst="bentConnector3">
@@ -5755,7 +5704,7 @@
         </p:nvSpPr>
         <p:spPr>
           <a:xfrm>
-            <a:off x="6172200" y="4114094"/>
+            <a:off x="6172200" y="4318518"/>
             <a:ext cx="1041701" cy="346760"/>
           </a:xfrm>
           <a:prstGeom prst="rect">
@@ -5817,7 +5766,7 @@
         </p:nvSpPr>
         <p:spPr>
           <a:xfrm>
-            <a:off x="7615738" y="4112124"/>
+            <a:off x="7615738" y="4316548"/>
             <a:ext cx="1259718" cy="346760"/>
           </a:xfrm>
           <a:prstGeom prst="rect">
@@ -5882,7 +5831,7 @@
         </p:nvCxnSpPr>
         <p:spPr>
           <a:xfrm flipV="1">
-            <a:off x="7213901" y="4285504"/>
+            <a:off x="7213901" y="4489928"/>
             <a:ext cx="401837" cy="786"/>
           </a:xfrm>
           <a:prstGeom prst="bentConnector3">
@@ -5906,6 +5855,59 @@
           </a:fillRef>
           <a:effectRef idx="1">
             <a:schemeClr val="accent6"/>
+          </a:effectRef>
+          <a:fontRef idx="minor">
+            <a:schemeClr val="dk1"/>
+          </a:fontRef>
+        </p:style>
+      </p:cxnSp>
+      <p:cxnSp>
+        <p:nvCxnSpPr>
+          <p:cNvPr id="57" name="Elbow Connector 122">
+            <a:extLst>
+              <a:ext uri="{FF2B5EF4-FFF2-40B4-BE49-F238E27FC236}">
+                <a16:creationId xmlns:a16="http://schemas.microsoft.com/office/drawing/2014/main" id="{C4E90F83-1DE6-4EB5-BCBF-1554A2EC4F28}"/>
+              </a:ext>
+            </a:extLst>
+          </p:cNvPr>
+          <p:cNvCxnSpPr>
+            <a:cxnSpLocks/>
+            <a:stCxn id="28" idx="0"/>
+            <a:endCxn id="50" idx="2"/>
+          </p:cNvCxnSpPr>
+          <p:nvPr/>
+        </p:nvCxnSpPr>
+        <p:spPr>
+          <a:xfrm rot="5400000" flipH="1" flipV="1">
+            <a:off x="5052264" y="3655982"/>
+            <a:ext cx="304800" cy="3237"/>
+          </a:xfrm>
+          <a:prstGeom prst="bentConnector3">
+            <a:avLst>
+              <a:gd name="adj1" fmla="val 50000"/>
+            </a:avLst>
+          </a:prstGeom>
+          <a:ln w="19050">
+            <a:solidFill>
+              <a:schemeClr val="accent6">
+                <a:lumMod val="75000"/>
+              </a:schemeClr>
+            </a:solidFill>
+            <a:prstDash val="sysDot"/>
+            <a:headEnd type="none" w="med" len="med"/>
+            <a:tailEnd type="arrow" w="med" len="med"/>
+          </a:ln>
+          <a:effectLst/>
+        </p:spPr>
+        <p:style>
+          <a:lnRef idx="1">
+            <a:schemeClr val="accent2"/>
+          </a:lnRef>
+          <a:fillRef idx="2">
+            <a:schemeClr val="accent2"/>
+          </a:fillRef>
+          <a:effectRef idx="1">
+            <a:schemeClr val="accent2"/>
           </a:effectRef>
           <a:fontRef idx="minor">
             <a:schemeClr val="dk1"/>

</xml_diff>

<commit_message>
fix error in Storage Diagram
</commit_message>
<xml_diff>
--- a/docs/diagrams/StorageComponentClassDiagram.pptx
+++ b/docs/diagrams/StorageComponentClassDiagram.pptx
@@ -3451,7 +3451,7 @@
         <p:spPr>
           <a:xfrm>
             <a:off x="1119865" y="2086382"/>
-            <a:ext cx="7566935" cy="2494496"/>
+            <a:ext cx="7566935" cy="2485618"/>
           </a:xfrm>
           <a:prstGeom prst="roundRect">
             <a:avLst>
@@ -5007,7 +5007,7 @@
                   </a:schemeClr>
                 </a:solidFill>
               </a:rPr>
-              <a:t>XmlAdaptedPerson</a:t>
+              <a:t>XmlAdaptedEvent</a:t>
             </a:r>
             <a:endParaRPr lang="en-SG" sz="1050" b="1" dirty="0">
               <a:solidFill>

</xml_diff>